<commit_message>
Added Documentation And Pictures to the presentations
</commit_message>
<xml_diff>
--- a/Team Arsenic.pptx
+++ b/Team Arsenic.pptx
@@ -5,25 +5,27 @@
     <p:sldMasterId id="2147483672" r:id="rId1"/>
   </p:sldMasterIdLst>
   <p:notesMasterIdLst>
-    <p:notesMasterId r:id="rId10"/>
+    <p:notesMasterId r:id="rId12"/>
   </p:notesMasterIdLst>
   <p:handoutMasterIdLst>
-    <p:handoutMasterId r:id="rId11"/>
+    <p:handoutMasterId r:id="rId13"/>
   </p:handoutMasterIdLst>
   <p:sldIdLst>
     <p:sldId id="258" r:id="rId2"/>
     <p:sldId id="302" r:id="rId3"/>
     <p:sldId id="303" r:id="rId4"/>
     <p:sldId id="309" r:id="rId5"/>
-    <p:sldId id="310" r:id="rId6"/>
-    <p:sldId id="311" r:id="rId7"/>
-    <p:sldId id="312" r:id="rId8"/>
-    <p:sldId id="308" r:id="rId9"/>
+    <p:sldId id="313" r:id="rId6"/>
+    <p:sldId id="310" r:id="rId7"/>
+    <p:sldId id="311" r:id="rId8"/>
+    <p:sldId id="314" r:id="rId9"/>
+    <p:sldId id="312" r:id="rId10"/>
+    <p:sldId id="308" r:id="rId11"/>
   </p:sldIdLst>
   <p:sldSz cx="9144000" cy="6858000" type="screen4x3"/>
   <p:notesSz cx="6881813" cy="9296400"/>
   <p:custDataLst>
-    <p:tags r:id="rId12"/>
+    <p:tags r:id="rId14"/>
   </p:custDataLst>
   <p:defaultTextStyle>
     <a:defPPr>
@@ -152,7 +154,7 @@
   </p:defaultTextStyle>
   <p:extLst>
     <p:ext uri="{EFAFB233-063F-42B5-8137-9DF3F51BA10A}">
-      <p15:sldGuideLst xmlns="" xmlns:p15="http://schemas.microsoft.com/office/powerpoint/2012/main">
+      <p15:sldGuideLst xmlns:p15="http://schemas.microsoft.com/office/powerpoint/2012/main" xmlns="">
         <p15:guide id="1" orient="horz" pos="2160">
           <p15:clr>
             <a:srgbClr val="A4A3A4"/>
@@ -166,7 +168,7 @@
       </p15:sldGuideLst>
     </p:ext>
     <p:ext uri="{2D200454-40CA-4A62-9FC3-DE9A4176ACB9}">
-      <p15:notesGuideLst xmlns="" xmlns:p15="http://schemas.microsoft.com/office/powerpoint/2012/main">
+      <p15:notesGuideLst xmlns:p15="http://schemas.microsoft.com/office/powerpoint/2012/main" xmlns="">
         <p15:guide id="1" orient="horz" pos="2928">
           <p15:clr>
             <a:srgbClr val="A4A3A4"/>
@@ -406,7 +408,7 @@
     </p:spTree>
     <p:extLst>
       <p:ext uri="{BB962C8B-B14F-4D97-AF65-F5344CB8AC3E}">
-        <p14:creationId xmlns:p14="http://schemas.microsoft.com/office/powerpoint/2010/main" xmlns="" val="1213240605"/>
+        <p14:creationId xmlns="" xmlns:p14="http://schemas.microsoft.com/office/powerpoint/2010/main" val="1213240605"/>
       </p:ext>
     </p:extLst>
   </p:cSld>
@@ -742,7 +744,7 @@
     </p:spTree>
     <p:extLst>
       <p:ext uri="{BB962C8B-B14F-4D97-AF65-F5344CB8AC3E}">
-        <p14:creationId xmlns:p14="http://schemas.microsoft.com/office/powerpoint/2010/main" xmlns="" val="3985201946"/>
+        <p14:creationId xmlns="" xmlns:p14="http://schemas.microsoft.com/office/powerpoint/2010/main" val="3985201946"/>
       </p:ext>
     </p:extLst>
   </p:cSld>
@@ -2197,7 +2199,7 @@
     </p:spTree>
     <p:extLst>
       <p:ext uri="{BB962C8B-B14F-4D97-AF65-F5344CB8AC3E}">
-        <p14:creationId xmlns:p14="http://schemas.microsoft.com/office/powerpoint/2010/main" xmlns="" val="3141685506"/>
+        <p14:creationId xmlns="" xmlns:p14="http://schemas.microsoft.com/office/powerpoint/2010/main" val="3141685506"/>
       </p:ext>
     </p:extLst>
   </p:cSld>
@@ -5063,7 +5065,7 @@
           <a:blip r:embed="rId7" cstate="print">
             <a:extLst>
               <a:ext uri="{28A0092B-C50C-407E-A947-70E740481C1C}">
-                <a14:useLocalDpi xmlns:a14="http://schemas.microsoft.com/office/drawing/2010/main" xmlns="" val="0"/>
+                <a14:useLocalDpi xmlns="" xmlns:a14="http://schemas.microsoft.com/office/drawing/2010/main" val="0"/>
               </a:ext>
             </a:extLst>
           </a:blip>
@@ -5083,7 +5085,7 @@
           <a:noFill/>
           <a:extLst>
             <a:ext uri="{909E8E84-426E-40DD-AFC4-6F175D3DCCD1}">
-              <a14:hiddenFill xmlns:a14="http://schemas.microsoft.com/office/drawing/2010/main" xmlns="">
+              <a14:hiddenFill xmlns="" xmlns:a14="http://schemas.microsoft.com/office/drawing/2010/main">
                 <a:solidFill>
                   <a:srgbClr val="FFFFFF"/>
                 </a:solidFill>
@@ -5104,7 +5106,7 @@
           <a:blip r:embed="rId8" cstate="email">
             <a:extLst>
               <a:ext uri="{28A0092B-C50C-407E-A947-70E740481C1C}">
-                <a14:useLocalDpi xmlns:a14="http://schemas.microsoft.com/office/drawing/2010/main" xmlns="" val="0"/>
+                <a14:useLocalDpi xmlns="" xmlns:a14="http://schemas.microsoft.com/office/drawing/2010/main" val="0"/>
               </a:ext>
             </a:extLst>
           </a:blip>
@@ -5128,14 +5130,14 @@
           <a:effectLst/>
           <a:extLst>
             <a:ext uri="{909E8E84-426E-40DD-AFC4-6F175D3DCCD1}">
-              <a14:hiddenFill xmlns:a14="http://schemas.microsoft.com/office/drawing/2010/main" xmlns="">
+              <a14:hiddenFill xmlns="" xmlns:a14="http://schemas.microsoft.com/office/drawing/2010/main">
                 <a:solidFill>
                   <a:schemeClr val="accent1"/>
                 </a:solidFill>
               </a14:hiddenFill>
             </a:ext>
             <a:ext uri="{91240B29-F687-4F45-9708-019B960494DF}">
-              <a14:hiddenLine xmlns:a14="http://schemas.microsoft.com/office/drawing/2010/main" xmlns="" w="9525">
+              <a14:hiddenLine xmlns="" xmlns:a14="http://schemas.microsoft.com/office/drawing/2010/main" w="9525">
                 <a:solidFill>
                   <a:schemeClr val="tx1"/>
                 </a:solidFill>
@@ -5145,7 +5147,7 @@
               </a14:hiddenLine>
             </a:ext>
             <a:ext uri="{AF507438-7753-43E0-B8FC-AC1667EBCBE1}">
-              <a14:hiddenEffects xmlns:a14="http://schemas.microsoft.com/office/drawing/2010/main" xmlns="">
+              <a14:hiddenEffects xmlns="" xmlns:a14="http://schemas.microsoft.com/office/drawing/2010/main">
                 <a:effectLst>
                   <a:outerShdw dist="35921" dir="2700000" algn="ctr" rotWithShape="0">
                     <a:schemeClr val="bg2"/>
@@ -5168,7 +5170,7 @@
           <a:blip r:embed="rId9" cstate="email">
             <a:extLst>
               <a:ext uri="{28A0092B-C50C-407E-A947-70E740481C1C}">
-                <a14:useLocalDpi xmlns:a14="http://schemas.microsoft.com/office/drawing/2010/main" xmlns="" val="0"/>
+                <a14:useLocalDpi xmlns="" xmlns:a14="http://schemas.microsoft.com/office/drawing/2010/main" val="0"/>
               </a:ext>
             </a:extLst>
           </a:blip>
@@ -5192,14 +5194,14 @@
           <a:effectLst/>
           <a:extLst>
             <a:ext uri="{909E8E84-426E-40DD-AFC4-6F175D3DCCD1}">
-              <a14:hiddenFill xmlns:a14="http://schemas.microsoft.com/office/drawing/2010/main" xmlns="">
+              <a14:hiddenFill xmlns="" xmlns:a14="http://schemas.microsoft.com/office/drawing/2010/main">
                 <a:solidFill>
                   <a:schemeClr val="accent1"/>
                 </a:solidFill>
               </a14:hiddenFill>
             </a:ext>
             <a:ext uri="{91240B29-F687-4F45-9708-019B960494DF}">
-              <a14:hiddenLine xmlns:a14="http://schemas.microsoft.com/office/drawing/2010/main" xmlns="" w="9525">
+              <a14:hiddenLine xmlns="" xmlns:a14="http://schemas.microsoft.com/office/drawing/2010/main" w="9525">
                 <a:solidFill>
                   <a:schemeClr val="tx1"/>
                 </a:solidFill>
@@ -5209,7 +5211,7 @@
               </a14:hiddenLine>
             </a:ext>
             <a:ext uri="{AF507438-7753-43E0-B8FC-AC1667EBCBE1}">
-              <a14:hiddenEffects xmlns:a14="http://schemas.microsoft.com/office/drawing/2010/main" xmlns="">
+              <a14:hiddenEffects xmlns="" xmlns:a14="http://schemas.microsoft.com/office/drawing/2010/main">
                 <a:effectLst>
                   <a:outerShdw dist="35921" dir="2700000" algn="ctr" rotWithShape="0">
                     <a:schemeClr val="bg2"/>
@@ -5232,7 +5234,7 @@
           <a:blip r:embed="rId10" cstate="print">
             <a:extLst>
               <a:ext uri="{BEBA8EAE-BF5A-486C-A8C5-ECC9F3942E4B}">
-                <a14:imgProps xmlns:a14="http://schemas.microsoft.com/office/drawing/2010/main" xmlns="">
+                <a14:imgProps xmlns="" xmlns:a14="http://schemas.microsoft.com/office/drawing/2010/main">
                   <a14:imgLayer r:embed="rId11">
                     <a14:imgEffect>
                       <a14:brightnessContrast bright="20000"/>
@@ -5241,7 +5243,7 @@
                 </a14:imgProps>
               </a:ext>
               <a:ext uri="{28A0092B-C50C-407E-A947-70E740481C1C}">
-                <a14:useLocalDpi xmlns:a14="http://schemas.microsoft.com/office/drawing/2010/main" xmlns="" val="0"/>
+                <a14:useLocalDpi xmlns="" xmlns:a14="http://schemas.microsoft.com/office/drawing/2010/main" val="0"/>
               </a:ext>
             </a:extLst>
           </a:blip>
@@ -5269,7 +5271,7 @@
           </a:effectLst>
           <a:extLst>
             <a:ext uri="{909E8E84-426E-40DD-AFC4-6F175D3DCCD1}">
-              <a14:hiddenFill xmlns:a14="http://schemas.microsoft.com/office/drawing/2010/main" xmlns="">
+              <a14:hiddenFill xmlns="" xmlns:a14="http://schemas.microsoft.com/office/drawing/2010/main">
                 <a:solidFill>
                   <a:srgbClr val="FFFFFF"/>
                 </a:solidFill>
@@ -5822,25 +5824,7 @@
                 </a:solidFill>
                 <a:latin typeface="+mj-lt"/>
               </a:rPr>
-              <a:t>Team </a:t>
-            </a:r>
-            <a:r>
-              <a:rPr lang="en-US" sz="4600" dirty="0" smtClean="0">
-                <a:solidFill>
-                  <a:schemeClr val="tx1"/>
-                </a:solidFill>
-                <a:latin typeface="+mj-lt"/>
-              </a:rPr>
-              <a:t>“Arsenic”</a:t>
-            </a:r>
-            <a:r>
-              <a:rPr lang="en-US" sz="4600" dirty="0" smtClean="0">
-                <a:solidFill>
-                  <a:schemeClr val="tx1"/>
-                </a:solidFill>
-                <a:latin typeface="+mj-lt"/>
-              </a:rPr>
-              <a:t/>
+              <a:t>Team “Arsenic”</a:t>
             </a:r>
             <a:br>
               <a:rPr lang="en-US" sz="4600" dirty="0" smtClean="0">
@@ -5857,23 +5841,8 @@
                 </a:solidFill>
                 <a:latin typeface="+mj-lt"/>
               </a:rPr>
-              <a:t>Project – </a:t>
-            </a:r>
-            <a:r>
-              <a:rPr lang="en-US" sz="4600" dirty="0" smtClean="0">
-                <a:solidFill>
-                  <a:schemeClr val="tx1"/>
-                </a:solidFill>
-                <a:latin typeface="+mj-lt"/>
-              </a:rPr>
-              <a:t>“Battle-Field-1”</a:t>
-            </a:r>
-            <a:endParaRPr lang="en-US" sz="4600" dirty="0" smtClean="0">
-              <a:solidFill>
-                <a:schemeClr val="tx1"/>
-              </a:solidFill>
-              <a:latin typeface="+mj-lt"/>
-            </a:endParaRPr>
+              <a:t>Project – “Battle-Field-1”</a:t>
+            </a:r>
           </a:p>
           <a:p>
             <a:pPr algn="ctr">
@@ -5999,9 +5968,263 @@
     </p:spTree>
     <p:extLst>
       <p:ext uri="{BB962C8B-B14F-4D97-AF65-F5344CB8AC3E}">
-        <p14:creationId xmlns:p14="http://schemas.microsoft.com/office/powerpoint/2010/main" xmlns="" val="4062452081"/>
+        <p14:creationId xmlns="" xmlns:p14="http://schemas.microsoft.com/office/powerpoint/2010/main" val="4062452081"/>
       </p:ext>
     </p:extLst>
+  </p:cSld>
+  <p:clrMapOvr>
+    <a:masterClrMapping/>
+  </p:clrMapOvr>
+  <p:timing>
+    <p:tnLst>
+      <p:par>
+        <p:cTn id="1" dur="indefinite" restart="never" nodeType="tmRoot"/>
+      </p:par>
+    </p:tnLst>
+  </p:timing>
+</p:sld>
+</file>
+
+<file path=ppt/slides/slide10.xml><?xml version="1.0" encoding="utf-8"?>
+<p:sld xmlns:a="http://schemas.openxmlformats.org/drawingml/2006/main" xmlns:r="http://schemas.openxmlformats.org/officeDocument/2006/relationships" xmlns:p="http://schemas.openxmlformats.org/presentationml/2006/main">
+  <p:cSld>
+    <p:spTree>
+      <p:nvGrpSpPr>
+        <p:cNvPr id="1" name=""/>
+        <p:cNvGrpSpPr/>
+        <p:nvPr/>
+      </p:nvGrpSpPr>
+      <p:grpSpPr>
+        <a:xfrm>
+          <a:off x="0" y="0"/>
+          <a:ext cx="0" cy="0"/>
+          <a:chOff x="0" y="0"/>
+          <a:chExt cx="0" cy="0"/>
+        </a:xfrm>
+      </p:grpSpPr>
+      <p:sp>
+        <p:nvSpPr>
+          <p:cNvPr id="2" name="Title 1"/>
+          <p:cNvSpPr>
+            <a:spLocks noGrp="1"/>
+          </p:cNvSpPr>
+          <p:nvPr>
+            <p:ph type="title"/>
+          </p:nvPr>
+        </p:nvSpPr>
+        <p:spPr/>
+        <p:txBody>
+          <a:bodyPr/>
+          <a:lstStyle/>
+          <a:p>
+            <a:r>
+              <a:rPr lang="en-US" dirty="0" smtClean="0"/>
+              <a:t>Resources &amp; Links </a:t>
+            </a:r>
+            <a:endParaRPr lang="en-US" dirty="0"/>
+          </a:p>
+        </p:txBody>
+      </p:sp>
+      <p:sp>
+        <p:nvSpPr>
+          <p:cNvPr id="3" name="Content Placeholder 2"/>
+          <p:cNvSpPr>
+            <a:spLocks noGrp="1"/>
+          </p:cNvSpPr>
+          <p:nvPr>
+            <p:ph idx="1"/>
+          </p:nvPr>
+        </p:nvSpPr>
+        <p:spPr/>
+        <p:txBody>
+          <a:bodyPr/>
+          <a:lstStyle/>
+          <a:p>
+            <a:pPr lvl="3">
+              <a:buNone/>
+            </a:pPr>
+            <a:r>
+              <a:rPr lang="en-US" sz="2400" dirty="0" smtClean="0">
+                <a:solidFill>
+                  <a:schemeClr val="tx1"/>
+                </a:solidFill>
+              </a:rPr>
+              <a:t>Repository:</a:t>
+            </a:r>
+            <a:endParaRPr lang="en-US" sz="2400" dirty="0" smtClean="0">
+              <a:solidFill>
+                <a:schemeClr val="tx1"/>
+              </a:solidFill>
+              <a:hlinkClick r:id="rId2"/>
+            </a:endParaRPr>
+          </a:p>
+          <a:p>
+            <a:pPr lvl="3">
+              <a:buNone/>
+            </a:pPr>
+            <a:r>
+              <a:rPr lang="en-US" sz="2000" dirty="0" smtClean="0">
+                <a:solidFill>
+                  <a:schemeClr val="tx1"/>
+                </a:solidFill>
+                <a:hlinkClick r:id="rId2"/>
+              </a:rPr>
+              <a:t>https://github.com/ilian-ivanov/TeamWorkArsenic</a:t>
+            </a:r>
+            <a:r>
+              <a:rPr lang="en-US" sz="2400" dirty="0" smtClean="0">
+                <a:solidFill>
+                  <a:schemeClr val="tx1"/>
+                </a:solidFill>
+                <a:hlinkClick r:id="rId2"/>
+              </a:rPr>
+              <a:t>/</a:t>
+            </a:r>
+            <a:endParaRPr lang="en-US" sz="2400" dirty="0" smtClean="0">
+              <a:solidFill>
+                <a:schemeClr val="tx1"/>
+              </a:solidFill>
+            </a:endParaRPr>
+          </a:p>
+          <a:p>
+            <a:pPr lvl="3">
+              <a:buNone/>
+            </a:pPr>
+            <a:r>
+              <a:rPr lang="en-US" sz="2400" dirty="0" smtClean="0">
+                <a:solidFill>
+                  <a:schemeClr val="tx1"/>
+                </a:solidFill>
+              </a:rPr>
+              <a:t>Log</a:t>
+            </a:r>
+            <a:r>
+              <a:rPr lang="en-US" sz="2800" dirty="0" smtClean="0">
+                <a:solidFill>
+                  <a:schemeClr val="tx1"/>
+                </a:solidFill>
+              </a:rPr>
+              <a:t>:</a:t>
+            </a:r>
+            <a:endParaRPr lang="en-US" sz="2800" dirty="0" smtClean="0">
+              <a:solidFill>
+                <a:schemeClr val="tx1"/>
+              </a:solidFill>
+              <a:hlinkClick r:id="rId2"/>
+            </a:endParaRPr>
+          </a:p>
+          <a:p>
+            <a:pPr lvl="3">
+              <a:buNone/>
+            </a:pPr>
+            <a:r>
+              <a:rPr lang="en-US" sz="2000" dirty="0" smtClean="0">
+                <a:hlinkClick r:id="rId3"/>
+              </a:rPr>
+              <a:t>https://github.com/ilian-ivanov/TeamWorkArsenic/commits/master</a:t>
+            </a:r>
+            <a:endParaRPr lang="en-US" sz="2000" dirty="0" smtClean="0">
+              <a:solidFill>
+                <a:schemeClr val="tx1"/>
+              </a:solidFill>
+            </a:endParaRPr>
+          </a:p>
+        </p:txBody>
+      </p:sp>
+      <p:sp>
+        <p:nvSpPr>
+          <p:cNvPr id="4" name="Slide Number Placeholder 3"/>
+          <p:cNvSpPr>
+            <a:spLocks noGrp="1"/>
+          </p:cNvSpPr>
+          <p:nvPr>
+            <p:ph type="sldNum" sz="quarter" idx="10"/>
+          </p:nvPr>
+        </p:nvSpPr>
+        <p:spPr/>
+        <p:txBody>
+          <a:bodyPr/>
+          <a:lstStyle/>
+          <a:p>
+            <a:pPr>
+              <a:defRPr/>
+            </a:pPr>
+            <a:fld id="{58452FF4-89E3-4D1B-9927-2DBDC00E58D7}" type="slidenum">
+              <a:rPr lang="en-US" smtClean="0"/>
+              <a:pPr>
+                <a:defRPr/>
+              </a:pPr>
+              <a:t>10</a:t>
+            </a:fld>
+            <a:endParaRPr lang="en-US" dirty="0"/>
+          </a:p>
+        </p:txBody>
+      </p:sp>
+      <p:sp>
+        <p:nvSpPr>
+          <p:cNvPr id="5" name="Title 1"/>
+          <p:cNvSpPr txBox="1">
+            <a:spLocks/>
+          </p:cNvSpPr>
+          <p:nvPr/>
+        </p:nvSpPr>
+        <p:spPr>
+          <a:xfrm>
+            <a:off x="457200" y="1524000"/>
+            <a:ext cx="7086600" cy="4495800"/>
+          </a:xfrm>
+          <a:prstGeom prst="rect">
+            <a:avLst/>
+          </a:prstGeom>
+        </p:spPr>
+        <p:txBody>
+          <a:bodyPr anchor="ctr" anchorCtr="0">
+            <a:noAutofit/>
+          </a:bodyPr>
+          <a:lstStyle/>
+          <a:p>
+            <a:pPr marL="0" marR="0" lvl="0" indent="0" defTabSz="914400" rtl="0" eaLnBrk="0" fontAlgn="base" latinLnBrk="0" hangingPunct="0">
+              <a:lnSpc>
+                <a:spcPts val="4000"/>
+              </a:lnSpc>
+              <a:spcBef>
+                <a:spcPct val="0"/>
+              </a:spcBef>
+              <a:spcAft>
+                <a:spcPct val="0"/>
+              </a:spcAft>
+              <a:buClrTx/>
+              <a:buSzTx/>
+              <a:buFontTx/>
+              <a:buNone/>
+              <a:tabLst/>
+              <a:defRPr/>
+            </a:pPr>
+            <a:endParaRPr kumimoji="0" lang="en-US" sz="4000" b="1" i="0" u="none" strike="noStrike" kern="1200" cap="none" spc="0" normalizeH="0" baseline="0" noProof="0" dirty="0">
+              <a:ln w="500">
+                <a:noFill/>
+              </a:ln>
+              <a:solidFill>
+                <a:schemeClr val="tx2"/>
+              </a:solidFill>
+              <a:effectLst>
+                <a:outerShdw blurRad="38100" dist="38100" dir="2700000" algn="tl">
+                  <a:srgbClr val="000000">
+                    <a:alpha val="43137"/>
+                  </a:srgbClr>
+                </a:outerShdw>
+                <a:reflection blurRad="12700" stA="20000" endPos="50000" dist="12700" dir="5400000" sy="-100000" algn="bl" rotWithShape="0"/>
+              </a:effectLst>
+              <a:uLnTx/>
+              <a:uFillTx/>
+              <a:latin typeface="+mj-lt"/>
+              <a:ea typeface="+mj-ea"/>
+              <a:cs typeface="+mj-cs"/>
+            </a:endParaRPr>
+          </a:p>
+        </p:txBody>
+      </p:sp>
+    </p:spTree>
   </p:cSld>
   <p:clrMapOvr>
     <a:masterClrMapping/>
@@ -6080,37 +6303,8 @@
                   <a:schemeClr val="tx2"/>
                 </a:solidFill>
               </a:rPr>
-              <a:t>		Introduced </a:t>
-            </a:r>
-            <a:r>
-              <a:rPr lang="en-US" dirty="0" smtClean="0">
-                <a:solidFill>
-                  <a:schemeClr val="tx2"/>
-                </a:solidFill>
-              </a:rPr>
-              <a:t>4 new classes to logically separate the given </a:t>
-            </a:r>
-            <a:r>
-              <a:rPr lang="en-US" dirty="0" smtClean="0">
-                <a:solidFill>
-                  <a:schemeClr val="tx2"/>
-                </a:solidFill>
-              </a:rPr>
-              <a:t>code from </a:t>
-            </a:r>
-            <a:r>
-              <a:rPr lang="en-US" dirty="0" smtClean="0">
-                <a:solidFill>
-                  <a:schemeClr val="tx2"/>
-                </a:solidFill>
-              </a:rPr>
-              <a:t>both classes Methods &amp; BattleFieldGame: </a:t>
-            </a:r>
-            <a:endParaRPr lang="en-US" dirty="0" smtClean="0">
-              <a:solidFill>
-                <a:schemeClr val="tx2"/>
-              </a:solidFill>
-            </a:endParaRPr>
+              <a:t>		Introduced 4 new classes to logically separate the given code from both classes Methods &amp; BattleFieldGame: </a:t>
+            </a:r>
           </a:p>
           <a:p>
             <a:pPr lvl="4"/>
@@ -6167,14 +6361,6 @@
               </a:rPr>
               <a:t>ConsoleInput</a:t>
             </a:r>
-            <a:endParaRPr lang="en-US" dirty="0" smtClean="0">
-              <a:solidFill>
-                <a:schemeClr val="tx1">
-                  <a:lumMod val="20000"/>
-                  <a:lumOff val="80000"/>
-                </a:schemeClr>
-              </a:solidFill>
-            </a:endParaRPr>
           </a:p>
           <a:p>
             <a:pPr lvl="1"/>
@@ -6302,15 +6488,7 @@
             <a:pPr lvl="3"/>
             <a:r>
               <a:rPr lang="en-US" dirty="0" smtClean="0"/>
-              <a:t>Run() </a:t>
-            </a:r>
-            <a:r>
-              <a:rPr lang="en-US" dirty="0" smtClean="0"/>
-              <a:t>– </a:t>
-            </a:r>
-            <a:r>
-              <a:rPr lang="en-US" dirty="0" smtClean="0"/>
-              <a:t>extracted from </a:t>
+              <a:t>Run() – extracted from </a:t>
             </a:r>
             <a:r>
               <a:rPr lang="en-US" dirty="0" smtClean="0">
@@ -6322,22 +6500,22 @@
             </a:r>
             <a:r>
               <a:rPr lang="en-US" dirty="0" smtClean="0"/>
-              <a:t>, controls the </a:t>
+              <a:t>, controls the lifecycle of the game</a:t>
+            </a:r>
+          </a:p>
+          <a:p>
+            <a:pPr lvl="3"/>
+            <a:r>
+              <a:rPr lang="en-US" dirty="0" err="1" smtClean="0"/>
+              <a:t>IsEndOfGame</a:t>
             </a:r>
             <a:r>
               <a:rPr lang="en-US" dirty="0" smtClean="0"/>
-              <a:t>lifecycle of the </a:t>
+              <a:t>() – </a:t>
             </a:r>
             <a:r>
               <a:rPr lang="en-US" dirty="0" smtClean="0"/>
-              <a:t>game</a:t>
-            </a:r>
-          </a:p>
-          <a:p>
-            <a:pPr lvl="3"/>
-            <a:r>
-              <a:rPr lang="en-US" dirty="0" smtClean="0"/>
-              <a:t>IsEndOfGame()– renamed from </a:t>
+              <a:t>renamed from </a:t>
             </a:r>
             <a:r>
               <a:rPr lang="en-US" dirty="0" smtClean="0">
@@ -6345,8 +6523,21 @@
                   <a:schemeClr val="tx2"/>
                 </a:solidFill>
               </a:rPr>
-              <a:t>Krai()</a:t>
-            </a:r>
+              <a:t>Krai</a:t>
+            </a:r>
+            <a:r>
+              <a:rPr lang="en-US" dirty="0" smtClean="0">
+                <a:solidFill>
+                  <a:schemeClr val="tx2"/>
+                </a:solidFill>
+              </a:rPr>
+              <a:t>()</a:t>
+            </a:r>
+          </a:p>
+          <a:p>
+            <a:pPr lvl="3">
+              <a:buNone/>
+            </a:pPr>
             <a:endParaRPr lang="en-US" dirty="0" smtClean="0">
               <a:solidFill>
                 <a:schemeClr val="tx2"/>
@@ -6384,6 +6575,30 @@
           </a:p>
         </p:txBody>
       </p:sp>
+      <p:pic>
+        <p:nvPicPr>
+          <p:cNvPr id="5" name="Picture 4" descr="Engine.jpg"/>
+          <p:cNvPicPr>
+            <a:picLocks noChangeAspect="1"/>
+          </p:cNvPicPr>
+          <p:nvPr/>
+        </p:nvPicPr>
+        <p:blipFill>
+          <a:blip r:embed="rId2" cstate="print"/>
+          <a:stretch>
+            <a:fillRect/>
+          </a:stretch>
+        </p:blipFill>
+        <p:spPr>
+          <a:xfrm>
+            <a:off x="762000" y="3429000"/>
+            <a:ext cx="7932928" cy="2438400"/>
+          </a:xfrm>
+          <a:prstGeom prst="rect">
+            <a:avLst/>
+          </a:prstGeom>
+        </p:spPr>
+      </p:pic>
     </p:spTree>
   </p:cSld>
   <p:clrMapOvr>
@@ -6483,15 +6698,7 @@
             </a:r>
             <a:r>
               <a:rPr lang="en-US" dirty="0" smtClean="0"/>
-              <a:t>, controls the </a:t>
-            </a:r>
-            <a:r>
-              <a:rPr lang="en-US" dirty="0" smtClean="0"/>
-              <a:t>lifecycle of the </a:t>
-            </a:r>
-            <a:r>
-              <a:rPr lang="en-US" dirty="0" smtClean="0"/>
-              <a:t>game</a:t>
+              <a:t>, controls the lifecycle of the game</a:t>
             </a:r>
           </a:p>
           <a:p>
@@ -6558,11 +6765,7 @@
             </a:r>
             <a:r>
               <a:rPr lang="en-US" dirty="0" smtClean="0"/>
-              <a:t>. Also called with proper names.  A few magic numbers removed and added enumeration for MineTypes</a:t>
-            </a:r>
-            <a:r>
-              <a:rPr lang="en-US" dirty="0" smtClean="0"/>
-              <a:t>.</a:t>
+              <a:t>. Also called with proper names.  A few magic numbers removed and added enumeration for MineTypes.</a:t>
             </a:r>
             <a:endParaRPr lang="en-US" dirty="0" smtClean="0">
               <a:solidFill>
@@ -6633,114 +6836,29 @@
           <a:chExt cx="0" cy="0"/>
         </a:xfrm>
       </p:grpSpPr>
-      <p:sp>
-        <p:nvSpPr>
-          <p:cNvPr id="2" name="Title 1"/>
-          <p:cNvSpPr>
-            <a:spLocks noGrp="1"/>
-          </p:cNvSpPr>
-          <p:nvPr>
-            <p:ph type="title"/>
-          </p:nvPr>
-        </p:nvSpPr>
-        <p:spPr/>
-        <p:txBody>
-          <a:bodyPr/>
-          <a:lstStyle/>
-          <a:p>
-            <a:r>
-              <a:rPr lang="en-US" dirty="0" smtClean="0"/>
-              <a:t>Workflow</a:t>
-            </a:r>
-            <a:endParaRPr lang="en-US" dirty="0"/>
-          </a:p>
-        </p:txBody>
-      </p:sp>
-      <p:sp>
-        <p:nvSpPr>
-          <p:cNvPr id="3" name="Content Placeholder 2"/>
-          <p:cNvSpPr>
-            <a:spLocks noGrp="1"/>
-          </p:cNvSpPr>
+      <p:pic>
+        <p:nvPicPr>
+          <p:cNvPr id="5" name="Content Placeholder 4" descr="ExplosionGenerator.png"/>
+          <p:cNvPicPr>
+            <a:picLocks noGrp="1" noChangeAspect="1"/>
+          </p:cNvPicPr>
           <p:nvPr>
             <p:ph idx="1"/>
           </p:nvPr>
-        </p:nvSpPr>
-        <p:spPr/>
-        <p:txBody>
-          <a:bodyPr/>
-          <a:lstStyle/>
-          <a:p>
-            <a:pPr lvl="1">
-              <a:buNone/>
-            </a:pPr>
-            <a:r>
-              <a:rPr lang="en-US" dirty="0" smtClean="0">
-                <a:solidFill>
-                  <a:schemeClr val="tx1"/>
-                </a:solidFill>
-              </a:rPr>
-              <a:t>class Renderer contains:</a:t>
-            </a:r>
-            <a:endParaRPr lang="en-US" dirty="0" smtClean="0"/>
-          </a:p>
-          <a:p>
-            <a:pPr lvl="3"/>
-            <a:r>
-              <a:rPr lang="en-US" dirty="0" smtClean="0"/>
-              <a:t>PrepareBattleField</a:t>
-            </a:r>
-            <a:r>
-              <a:rPr lang="en-US" dirty="0" smtClean="0"/>
-              <a:t>() – extracted from </a:t>
-            </a:r>
-            <a:r>
-              <a:rPr lang="en-US" dirty="0" smtClean="0">
-                <a:solidFill>
-                  <a:schemeClr val="tx2"/>
-                </a:solidFill>
-              </a:rPr>
-              <a:t>Main()</a:t>
-            </a:r>
-            <a:endParaRPr lang="en-US" dirty="0" smtClean="0"/>
-          </a:p>
-          <a:p>
-            <a:pPr lvl="3"/>
-            <a:r>
-              <a:rPr lang="en-US" dirty="0" smtClean="0"/>
-              <a:t>FillBattleField() – refacored from </a:t>
-            </a:r>
-            <a:r>
-              <a:rPr lang="en-US" dirty="0" smtClean="0">
-                <a:solidFill>
-                  <a:schemeClr val="tx2"/>
-                </a:solidFill>
-              </a:rPr>
-              <a:t>AddBombs()</a:t>
-            </a:r>
-          </a:p>
-          <a:p>
-            <a:pPr lvl="3"/>
-            <a:r>
-              <a:rPr lang="en-US" dirty="0" smtClean="0"/>
-              <a:t>VisualizeBattleField() – draws the game.</a:t>
-            </a:r>
-            <a:endParaRPr lang="en-US" dirty="0" smtClean="0">
-              <a:solidFill>
-                <a:schemeClr val="tx2"/>
-              </a:solidFill>
-            </a:endParaRPr>
-          </a:p>
-          <a:p>
-            <a:pPr lvl="3"/>
-            <a:endParaRPr lang="en-US" dirty="0" smtClean="0">
-              <a:solidFill>
-                <a:schemeClr val="tx2"/>
-              </a:solidFill>
-            </a:endParaRPr>
-          </a:p>
-        </p:txBody>
-      </p:sp>
+        </p:nvPicPr>
+        <p:blipFill>
+          <a:blip r:embed="rId2" cstate="print"/>
+          <a:stretch>
+            <a:fillRect/>
+          </a:stretch>
+        </p:blipFill>
+        <p:spPr>
+          <a:xfrm>
+            <a:off x="1600200" y="914400"/>
+            <a:ext cx="6163057" cy="5314830"/>
+          </a:xfrm>
+        </p:spPr>
+      </p:pic>
       <p:sp>
         <p:nvSpPr>
           <p:cNvPr id="4" name="Slide Number Placeholder 3"/>
@@ -6775,13 +6893,6 @@
   <p:clrMapOvr>
     <a:masterClrMapping/>
   </p:clrMapOvr>
-  <p:timing>
-    <p:tnLst>
-      <p:par>
-        <p:cTn id="1" dur="indefinite" restart="never" nodeType="tmRoot"/>
-      </p:par>
-    </p:tnLst>
-  </p:timing>
 </p:sld>
 </file>
 
@@ -6835,12 +6946,7 @@
             <p:ph idx="1"/>
           </p:nvPr>
         </p:nvSpPr>
-        <p:spPr>
-          <a:xfrm>
-            <a:off x="-304800" y="1066800"/>
-            <a:ext cx="9372600" cy="5791200"/>
-          </a:xfrm>
-        </p:spPr>
+        <p:spPr/>
         <p:txBody>
           <a:bodyPr/>
           <a:lstStyle/>
@@ -6854,7 +6960,7 @@
                   <a:schemeClr val="tx1"/>
                 </a:solidFill>
               </a:rPr>
-              <a:t>class ConsoleInput contains:</a:t>
+              <a:t>class Renderer contains:</a:t>
             </a:r>
             <a:endParaRPr lang="en-US" dirty="0" smtClean="0"/>
           </a:p>
@@ -6862,11 +6968,7 @@
             <a:pPr lvl="3"/>
             <a:r>
               <a:rPr lang="en-US" dirty="0" smtClean="0"/>
-              <a:t>TakeSizeOfBattleField</a:t>
-            </a:r>
-            <a:r>
-              <a:rPr lang="en-US" dirty="0" smtClean="0"/>
-              <a:t>() – extracted from </a:t>
+              <a:t>PrepareBattleField() – extracted from </a:t>
             </a:r>
             <a:r>
               <a:rPr lang="en-US" dirty="0" smtClean="0">
@@ -6882,116 +6984,32 @@
             <a:pPr lvl="3"/>
             <a:r>
               <a:rPr lang="en-US" dirty="0" smtClean="0"/>
-              <a:t>ReadPlayerMove</a:t>
-            </a:r>
+              <a:t>FillBattleField() – refacored from </a:t>
+            </a:r>
+            <a:r>
+              <a:rPr lang="en-US" dirty="0" smtClean="0">
+                <a:solidFill>
+                  <a:schemeClr val="tx2"/>
+                </a:solidFill>
+              </a:rPr>
+              <a:t>AddBombs()</a:t>
+            </a:r>
+          </a:p>
+          <a:p>
+            <a:pPr lvl="3"/>
             <a:r>
               <a:rPr lang="en-US" dirty="0" smtClean="0"/>
-              <a:t>() – loops until correct input is entered (</a:t>
+              <a:t>VisualizeBattleField() – draws the game</a:t>
             </a:r>
             <a:r>
               <a:rPr lang="en-US" dirty="0" smtClean="0"/>
-              <a:t>extracted </a:t>
-            </a:r>
-            <a:r>
-              <a:rPr lang="en-US" dirty="0" smtClean="0"/>
-              <a:t>from </a:t>
-            </a:r>
-            <a:r>
-              <a:rPr lang="en-US" dirty="0" smtClean="0">
-                <a:solidFill>
-                  <a:schemeClr val="tx2"/>
-                </a:solidFill>
-              </a:rPr>
-              <a:t>vremeEIgrachaDaDeistva()</a:t>
-            </a:r>
-            <a:r>
-              <a:rPr lang="en-US" dirty="0" smtClean="0"/>
-              <a:t>)</a:t>
-            </a:r>
-            <a:endParaRPr lang="en-US" dirty="0" smtClean="0">
-              <a:solidFill>
-                <a:schemeClr val="tx2"/>
-              </a:solidFill>
-            </a:endParaRPr>
-          </a:p>
-          <a:p>
-            <a:pPr lvl="3"/>
-            <a:r>
-              <a:rPr lang="en-US" dirty="0" smtClean="0"/>
-              <a:t>TryParseValidUserInput</a:t>
-            </a:r>
-            <a:r>
-              <a:rPr lang="en-US" dirty="0" smtClean="0"/>
-              <a:t>() – checks for valid format of the data. (</a:t>
-            </a:r>
-            <a:r>
-              <a:rPr lang="en-US" dirty="0" smtClean="0"/>
-              <a:t>extracted from </a:t>
-            </a:r>
-            <a:r>
-              <a:rPr lang="en-US" dirty="0" smtClean="0">
-                <a:solidFill>
-                  <a:schemeClr val="tx2"/>
-                </a:solidFill>
-              </a:rPr>
-              <a:t>vremeEIgrachaDaDeistva()</a:t>
-            </a:r>
-            <a:r>
-              <a:rPr lang="en-US" dirty="0" smtClean="0"/>
-              <a:t>)</a:t>
-            </a:r>
-            <a:endParaRPr lang="en-US" dirty="0" smtClean="0"/>
-          </a:p>
-          <a:p>
-            <a:pPr lvl="3"/>
-            <a:r>
-              <a:rPr lang="en-US" dirty="0" smtClean="0"/>
-              <a:t>IsInputValidCoordinate() – checks if the data is valid coordinate. (</a:t>
-            </a:r>
-            <a:r>
-              <a:rPr lang="en-US" dirty="0" smtClean="0"/>
-              <a:t>extracted from </a:t>
-            </a:r>
-            <a:r>
-              <a:rPr lang="en-US" dirty="0" smtClean="0">
-                <a:solidFill>
-                  <a:schemeClr val="tx2"/>
-                </a:solidFill>
-              </a:rPr>
-              <a:t>vremeEIgrachaDaDeistva()</a:t>
-            </a:r>
-            <a:r>
-              <a:rPr lang="en-US" dirty="0" smtClean="0"/>
-              <a:t>)</a:t>
-            </a:r>
-            <a:endParaRPr lang="en-US" dirty="0" smtClean="0"/>
-          </a:p>
-          <a:p>
-            <a:pPr lvl="3"/>
-            <a:r>
-              <a:rPr lang="en-US" dirty="0" smtClean="0"/>
-              <a:t>IsPlayerValidMove()  – checks if the data is valid game movement. (</a:t>
-            </a:r>
-            <a:r>
-              <a:rPr lang="en-US" dirty="0" smtClean="0"/>
-              <a:t>extracted from </a:t>
-            </a:r>
-            <a:r>
-              <a:rPr lang="en-US" dirty="0" smtClean="0">
-                <a:solidFill>
-                  <a:schemeClr val="tx2"/>
-                </a:solidFill>
-              </a:rPr>
-              <a:t>vremeEIgrachaDaDeistva()</a:t>
-            </a:r>
-            <a:r>
-              <a:rPr lang="en-US" dirty="0" smtClean="0"/>
-              <a:t>)</a:t>
-            </a:r>
-            <a:endParaRPr lang="en-US" dirty="0" smtClean="0"/>
-          </a:p>
-          <a:p>
-            <a:pPr lvl="3"/>
+              <a:t>.</a:t>
+            </a:r>
+          </a:p>
+          <a:p>
+            <a:pPr lvl="3">
+              <a:buNone/>
+            </a:pPr>
             <a:endParaRPr lang="en-US" dirty="0" smtClean="0">
               <a:solidFill>
                 <a:schemeClr val="tx2"/>
@@ -7037,6 +7055,30 @@
           </a:p>
         </p:txBody>
       </p:sp>
+      <p:pic>
+        <p:nvPicPr>
+          <p:cNvPr id="5" name="Picture 4" descr="Renderer.jpg"/>
+          <p:cNvPicPr>
+            <a:picLocks noChangeAspect="1"/>
+          </p:cNvPicPr>
+          <p:nvPr/>
+        </p:nvPicPr>
+        <p:blipFill>
+          <a:blip r:embed="rId2" cstate="print"/>
+          <a:stretch>
+            <a:fillRect/>
+          </a:stretch>
+        </p:blipFill>
+        <p:spPr>
+          <a:xfrm>
+            <a:off x="533400" y="3429000"/>
+            <a:ext cx="8325167" cy="2690813"/>
+          </a:xfrm>
+          <a:prstGeom prst="rect">
+            <a:avLst/>
+          </a:prstGeom>
+        </p:spPr>
+      </p:pic>
     </p:spTree>
   </p:cSld>
   <p:clrMapOvr>
@@ -7086,7 +7128,7 @@
           <a:p>
             <a:r>
               <a:rPr lang="en-US" dirty="0" smtClean="0"/>
-              <a:t>Code</a:t>
+              <a:t>Workflow</a:t>
             </a:r>
             <a:endParaRPr lang="en-US" dirty="0"/>
           </a:p>
@@ -7102,53 +7144,147 @@
             <p:ph idx="1"/>
           </p:nvPr>
         </p:nvSpPr>
-        <p:spPr/>
+        <p:spPr>
+          <a:xfrm>
+            <a:off x="-304800" y="1066800"/>
+            <a:ext cx="9372600" cy="5791200"/>
+          </a:xfrm>
+        </p:spPr>
         <p:txBody>
           <a:bodyPr/>
           <a:lstStyle/>
           <a:p>
-            <a:pPr lvl="3">
+            <a:pPr lvl="1">
               <a:buNone/>
             </a:pPr>
-            <a:endParaRPr lang="en-US" sz="2400" dirty="0" smtClean="0">
+            <a:r>
+              <a:rPr lang="en-US" dirty="0" smtClean="0">
+                <a:solidFill>
+                  <a:schemeClr val="tx1"/>
+                </a:solidFill>
+              </a:rPr>
+              <a:t>   class </a:t>
+            </a:r>
+            <a:r>
+              <a:rPr lang="en-US" dirty="0" smtClean="0">
+                <a:solidFill>
+                  <a:schemeClr val="tx1"/>
+                </a:solidFill>
+              </a:rPr>
+              <a:t>ConsoleInput contains:</a:t>
+            </a:r>
+            <a:endParaRPr lang="en-US" dirty="0" smtClean="0"/>
+          </a:p>
+          <a:p>
+            <a:pPr lvl="3"/>
+            <a:r>
+              <a:rPr lang="en-US" dirty="0" smtClean="0"/>
+              <a:t>TakeSizeOfBattleField() – extracted from </a:t>
+            </a:r>
+            <a:r>
+              <a:rPr lang="en-US" dirty="0" smtClean="0">
+                <a:solidFill>
+                  <a:schemeClr val="tx2"/>
+                </a:solidFill>
+              </a:rPr>
+              <a:t>Main()</a:t>
+            </a:r>
+            <a:endParaRPr lang="en-US" dirty="0" smtClean="0"/>
+          </a:p>
+          <a:p>
+            <a:pPr lvl="3"/>
+            <a:r>
+              <a:rPr lang="en-US" dirty="0" smtClean="0"/>
+              <a:t>ReadPlayerMove() – loops until correct input is entered (extracted from </a:t>
+            </a:r>
+            <a:r>
+              <a:rPr lang="en-US" dirty="0" smtClean="0">
+                <a:solidFill>
+                  <a:schemeClr val="tx2"/>
+                </a:solidFill>
+              </a:rPr>
+              <a:t>vremeEIgrachaDaDeistva()</a:t>
+            </a:r>
+            <a:r>
+              <a:rPr lang="en-US" dirty="0" smtClean="0"/>
+              <a:t>)</a:t>
+            </a:r>
+            <a:endParaRPr lang="en-US" dirty="0" smtClean="0">
               <a:solidFill>
-                <a:schemeClr val="tx1"/>
+                <a:schemeClr val="tx2"/>
               </a:solidFill>
             </a:endParaRPr>
           </a:p>
           <a:p>
-            <a:pPr lvl="3">
-              <a:buNone/>
-            </a:pPr>
-            <a:endParaRPr lang="en-US" sz="4600" dirty="0" smtClean="0">
+            <a:pPr lvl="3"/>
+            <a:r>
+              <a:rPr lang="en-US" dirty="0" smtClean="0"/>
+              <a:t>TryParseValidUserInput() – checks for valid format of the data. (extracted from </a:t>
+            </a:r>
+            <a:r>
+              <a:rPr lang="en-US" dirty="0" smtClean="0">
+                <a:solidFill>
+                  <a:schemeClr val="tx2"/>
+                </a:solidFill>
+              </a:rPr>
+              <a:t>vremeEIgrachaDaDeistva()</a:t>
+            </a:r>
+            <a:r>
+              <a:rPr lang="en-US" dirty="0" smtClean="0"/>
+              <a:t>)</a:t>
+            </a:r>
+          </a:p>
+          <a:p>
+            <a:pPr lvl="3"/>
+            <a:r>
+              <a:rPr lang="en-US" dirty="0" smtClean="0"/>
+              <a:t>IsInputValidCoordinate() – checks if the data is valid coordinate. (extracted from </a:t>
+            </a:r>
+            <a:r>
+              <a:rPr lang="en-US" dirty="0" smtClean="0">
+                <a:solidFill>
+                  <a:schemeClr val="tx2"/>
+                </a:solidFill>
+              </a:rPr>
+              <a:t>vremeEIgrachaDaDeistva()</a:t>
+            </a:r>
+            <a:r>
+              <a:rPr lang="en-US" dirty="0" smtClean="0"/>
+              <a:t>)</a:t>
+            </a:r>
+          </a:p>
+          <a:p>
+            <a:pPr lvl="3"/>
+            <a:r>
+              <a:rPr lang="en-US" dirty="0" smtClean="0"/>
+              <a:t>IsPlayerValidMove()  – checks if the data is valid game movement. (extracted from </a:t>
+            </a:r>
+            <a:r>
+              <a:rPr lang="en-US" dirty="0" smtClean="0">
+                <a:solidFill>
+                  <a:schemeClr val="tx2"/>
+                </a:solidFill>
+              </a:rPr>
+              <a:t>vremeEIgrachaDaDeistva()</a:t>
+            </a:r>
+            <a:r>
+              <a:rPr lang="en-US" dirty="0" smtClean="0"/>
+              <a:t>)</a:t>
+            </a:r>
+          </a:p>
+          <a:p>
+            <a:pPr lvl="3"/>
+            <a:endParaRPr lang="en-US" dirty="0" smtClean="0">
               <a:solidFill>
-                <a:schemeClr val="tx1"/>
+                <a:schemeClr val="tx2"/>
               </a:solidFill>
             </a:endParaRPr>
           </a:p>
           <a:p>
-            <a:pPr lvl="3">
-              <a:buNone/>
-            </a:pPr>
-            <a:r>
-              <a:rPr lang="en-US" sz="4600" dirty="0" smtClean="0">
-                <a:solidFill>
-                  <a:schemeClr val="tx1"/>
-                </a:solidFill>
-              </a:rPr>
-              <a:t>	</a:t>
-            </a:r>
-            <a:r>
-              <a:rPr lang="en-US" sz="4600" dirty="0" smtClean="0">
-                <a:solidFill>
-                  <a:schemeClr val="tx1"/>
-                </a:solidFill>
-              </a:rPr>
-              <a:t>	Demo &amp; Unit Tests</a:t>
-            </a:r>
-            <a:endParaRPr lang="en-US" sz="4600" dirty="0" smtClean="0">
+            <a:pPr lvl="3"/>
+            <a:endParaRPr lang="en-US" dirty="0" smtClean="0">
               <a:solidFill>
-                <a:schemeClr val="tx1"/>
+                <a:schemeClr val="tx2"/>
               </a:solidFill>
             </a:endParaRPr>
           </a:p>
@@ -7180,70 +7316,6 @@
               <a:t>7</a:t>
             </a:fld>
             <a:endParaRPr lang="en-US" dirty="0"/>
-          </a:p>
-        </p:txBody>
-      </p:sp>
-      <p:sp>
-        <p:nvSpPr>
-          <p:cNvPr id="5" name="Title 1"/>
-          <p:cNvSpPr txBox="1">
-            <a:spLocks/>
-          </p:cNvSpPr>
-          <p:nvPr/>
-        </p:nvSpPr>
-        <p:spPr>
-          <a:xfrm>
-            <a:off x="457200" y="1524000"/>
-            <a:ext cx="7086600" cy="4495800"/>
-          </a:xfrm>
-          <a:prstGeom prst="rect">
-            <a:avLst/>
-          </a:prstGeom>
-        </p:spPr>
-        <p:txBody>
-          <a:bodyPr anchor="ctr" anchorCtr="0">
-            <a:noAutofit/>
-          </a:bodyPr>
-          <a:lstStyle/>
-          <a:p>
-            <a:pPr marL="0" marR="0" lvl="0" indent="0" defTabSz="914400" rtl="0" eaLnBrk="0" fontAlgn="base" latinLnBrk="0" hangingPunct="0">
-              <a:lnSpc>
-                <a:spcPts val="4000"/>
-              </a:lnSpc>
-              <a:spcBef>
-                <a:spcPct val="0"/>
-              </a:spcBef>
-              <a:spcAft>
-                <a:spcPct val="0"/>
-              </a:spcAft>
-              <a:buClrTx/>
-              <a:buSzTx/>
-              <a:buFontTx/>
-              <a:buNone/>
-              <a:tabLst/>
-              <a:defRPr/>
-            </a:pPr>
-            <a:endParaRPr kumimoji="0" lang="en-US" sz="4000" b="1" i="0" u="none" strike="noStrike" kern="1200" cap="none" spc="0" normalizeH="0" baseline="0" noProof="0" dirty="0">
-              <a:ln w="500">
-                <a:noFill/>
-              </a:ln>
-              <a:solidFill>
-                <a:schemeClr val="tx2"/>
-              </a:solidFill>
-              <a:effectLst>
-                <a:outerShdw blurRad="38100" dist="38100" dir="2700000" algn="tl">
-                  <a:srgbClr val="000000">
-                    <a:alpha val="43137"/>
-                  </a:srgbClr>
-                </a:outerShdw>
-                <a:reflection blurRad="12700" stA="20000" endPos="50000" dist="12700" dir="5400000" sy="-100000" algn="bl" rotWithShape="0"/>
-              </a:effectLst>
-              <a:uLnTx/>
-              <a:uFillTx/>
-              <a:latin typeface="+mj-lt"/>
-              <a:ea typeface="+mj-ea"/>
-              <a:cs typeface="+mj-cs"/>
-            </a:endParaRPr>
           </a:p>
         </p:txBody>
       </p:sp>
@@ -7279,6 +7351,83 @@
           <a:chExt cx="0" cy="0"/>
         </a:xfrm>
       </p:grpSpPr>
+      <p:pic>
+        <p:nvPicPr>
+          <p:cNvPr id="5" name="Content Placeholder 4" descr="ConsoleInput.jpg"/>
+          <p:cNvPicPr>
+            <a:picLocks noGrp="1" noChangeAspect="1"/>
+          </p:cNvPicPr>
+          <p:nvPr>
+            <p:ph idx="1"/>
+          </p:nvPr>
+        </p:nvPicPr>
+        <p:blipFill>
+          <a:blip r:embed="rId2" cstate="print"/>
+          <a:stretch>
+            <a:fillRect/>
+          </a:stretch>
+        </p:blipFill>
+        <p:spPr>
+          <a:xfrm>
+            <a:off x="533400" y="1905000"/>
+            <a:ext cx="8153400" cy="3810000"/>
+          </a:xfrm>
+        </p:spPr>
+      </p:pic>
+      <p:sp>
+        <p:nvSpPr>
+          <p:cNvPr id="4" name="Slide Number Placeholder 3"/>
+          <p:cNvSpPr>
+            <a:spLocks noGrp="1"/>
+          </p:cNvSpPr>
+          <p:nvPr>
+            <p:ph type="sldNum" sz="quarter" idx="10"/>
+          </p:nvPr>
+        </p:nvSpPr>
+        <p:spPr/>
+        <p:txBody>
+          <a:bodyPr/>
+          <a:lstStyle/>
+          <a:p>
+            <a:pPr>
+              <a:defRPr/>
+            </a:pPr>
+            <a:fld id="{58452FF4-89E3-4D1B-9927-2DBDC00E58D7}" type="slidenum">
+              <a:rPr lang="en-US" smtClean="0"/>
+              <a:pPr>
+                <a:defRPr/>
+              </a:pPr>
+              <a:t>8</a:t>
+            </a:fld>
+            <a:endParaRPr lang="en-US" dirty="0"/>
+          </a:p>
+        </p:txBody>
+      </p:sp>
+    </p:spTree>
+  </p:cSld>
+  <p:clrMapOvr>
+    <a:masterClrMapping/>
+  </p:clrMapOvr>
+</p:sld>
+</file>
+
+<file path=ppt/slides/slide9.xml><?xml version="1.0" encoding="utf-8"?>
+<p:sld xmlns:a="http://schemas.openxmlformats.org/drawingml/2006/main" xmlns:r="http://schemas.openxmlformats.org/officeDocument/2006/relationships" xmlns:p="http://schemas.openxmlformats.org/presentationml/2006/main">
+  <p:cSld>
+    <p:spTree>
+      <p:nvGrpSpPr>
+        <p:cNvPr id="1" name=""/>
+        <p:cNvGrpSpPr/>
+        <p:nvPr/>
+      </p:nvGrpSpPr>
+      <p:grpSpPr>
+        <a:xfrm>
+          <a:off x="0" y="0"/>
+          <a:ext cx="0" cy="0"/>
+          <a:chOff x="0" y="0"/>
+          <a:chExt cx="0" cy="0"/>
+        </a:xfrm>
+      </p:grpSpPr>
       <p:sp>
         <p:nvSpPr>
           <p:cNvPr id="2" name="Title 1"/>
@@ -7296,7 +7445,7 @@
           <a:p>
             <a:r>
               <a:rPr lang="en-US" dirty="0" smtClean="0"/>
-              <a:t>Resources &amp; Links </a:t>
+              <a:t>Code</a:t>
             </a:r>
             <a:endParaRPr lang="en-US" dirty="0"/>
           </a:p>
@@ -7320,51 +7469,6 @@
             <a:pPr lvl="3">
               <a:buNone/>
             </a:pPr>
-            <a:r>
-              <a:rPr lang="en-US" sz="2400" dirty="0" smtClean="0">
-                <a:solidFill>
-                  <a:schemeClr val="tx1"/>
-                </a:solidFill>
-              </a:rPr>
-              <a:t>Repository</a:t>
-            </a:r>
-            <a:r>
-              <a:rPr lang="en-US" sz="2400" dirty="0" smtClean="0">
-                <a:solidFill>
-                  <a:schemeClr val="tx1"/>
-                </a:solidFill>
-              </a:rPr>
-              <a:t>:</a:t>
-            </a:r>
-            <a:endParaRPr lang="en-US" sz="2400" dirty="0" smtClean="0">
-              <a:solidFill>
-                <a:schemeClr val="tx1"/>
-              </a:solidFill>
-              <a:hlinkClick r:id="rId2"/>
-            </a:endParaRPr>
-          </a:p>
-          <a:p>
-            <a:pPr lvl="3">
-              <a:buNone/>
-            </a:pPr>
-            <a:r>
-              <a:rPr lang="en-US" sz="2000" dirty="0" smtClean="0">
-                <a:solidFill>
-                  <a:schemeClr val="tx1"/>
-                </a:solidFill>
-                <a:hlinkClick r:id="rId2"/>
-              </a:rPr>
-              <a:t>https://github.com/ilian-ivanov/TeamWorkArsenic</a:t>
-            </a:r>
-            <a:r>
-              <a:rPr lang="en-US" sz="2400" dirty="0" smtClean="0">
-                <a:solidFill>
-                  <a:schemeClr val="tx1"/>
-                </a:solidFill>
-                <a:hlinkClick r:id="rId2"/>
-              </a:rPr>
-              <a:t>/</a:t>
-            </a:r>
             <a:endParaRPr lang="en-US" sz="2400" dirty="0" smtClean="0">
               <a:solidFill>
                 <a:schemeClr val="tx1"/>
@@ -7375,44 +7479,24 @@
             <a:pPr lvl="3">
               <a:buNone/>
             </a:pPr>
-            <a:r>
-              <a:rPr lang="en-US" sz="2400" dirty="0" smtClean="0">
-                <a:solidFill>
-                  <a:schemeClr val="tx1"/>
-                </a:solidFill>
-              </a:rPr>
-              <a:t>Log</a:t>
-            </a:r>
-            <a:r>
-              <a:rPr lang="en-US" sz="2800" dirty="0" smtClean="0">
-                <a:solidFill>
-                  <a:schemeClr val="tx1"/>
-                </a:solidFill>
-              </a:rPr>
-              <a:t>:</a:t>
-            </a:r>
-            <a:endParaRPr lang="en-US" sz="2800" dirty="0" smtClean="0">
-              <a:solidFill>
-                <a:schemeClr val="tx1"/>
-              </a:solidFill>
-              <a:hlinkClick r:id="rId2"/>
-            </a:endParaRPr>
-          </a:p>
-          <a:p>
-            <a:pPr lvl="3">
-              <a:buNone/>
-            </a:pPr>
-            <a:r>
-              <a:rPr lang="en-US" sz="2000" dirty="0" smtClean="0">
-                <a:hlinkClick r:id="rId3"/>
-              </a:rPr>
-              <a:t>https://github.com/ilian-ivanov/TeamWorkArsenic/commits/master</a:t>
-            </a:r>
-            <a:endParaRPr lang="en-US" sz="2000" dirty="0" smtClean="0">
+            <a:endParaRPr lang="en-US" sz="4600" dirty="0" smtClean="0">
               <a:solidFill>
                 <a:schemeClr val="tx1"/>
               </a:solidFill>
             </a:endParaRPr>
+          </a:p>
+          <a:p>
+            <a:pPr lvl="3">
+              <a:buNone/>
+            </a:pPr>
+            <a:r>
+              <a:rPr lang="en-US" sz="4600" dirty="0" smtClean="0">
+                <a:solidFill>
+                  <a:schemeClr val="tx1"/>
+                </a:solidFill>
+              </a:rPr>
+              <a:t>		Demo &amp; Unit Tests</a:t>
+            </a:r>
           </a:p>
         </p:txBody>
       </p:sp>
@@ -7439,7 +7523,7 @@
               <a:pPr>
                 <a:defRPr/>
               </a:pPr>
-              <a:t>8</a:t>
+              <a:t>9</a:t>
             </a:fld>
             <a:endParaRPr lang="en-US" dirty="0"/>
           </a:p>

</xml_diff>

<commit_message>
Last update of presentation and documentation
</commit_message>
<xml_diff>
--- a/Team Arsenic.pptx
+++ b/Team Arsenic.pptx
@@ -154,7 +154,7 @@
   </p:defaultTextStyle>
   <p:extLst>
     <p:ext uri="{EFAFB233-063F-42B5-8137-9DF3F51BA10A}">
-      <p15:sldGuideLst xmlns:p15="http://schemas.microsoft.com/office/powerpoint/2012/main" xmlns="">
+      <p15:sldGuideLst xmlns="" xmlns:p15="http://schemas.microsoft.com/office/powerpoint/2012/main">
         <p15:guide id="1" orient="horz" pos="2160">
           <p15:clr>
             <a:srgbClr val="A4A3A4"/>
@@ -168,7 +168,7 @@
       </p15:sldGuideLst>
     </p:ext>
     <p:ext uri="{2D200454-40CA-4A62-9FC3-DE9A4176ACB9}">
-      <p15:notesGuideLst xmlns:p15="http://schemas.microsoft.com/office/powerpoint/2012/main" xmlns="">
+      <p15:notesGuideLst xmlns="" xmlns:p15="http://schemas.microsoft.com/office/powerpoint/2012/main">
         <p15:guide id="1" orient="horz" pos="2928">
           <p15:clr>
             <a:srgbClr val="A4A3A4"/>
@@ -408,7 +408,7 @@
     </p:spTree>
     <p:extLst>
       <p:ext uri="{BB962C8B-B14F-4D97-AF65-F5344CB8AC3E}">
-        <p14:creationId xmlns="" xmlns:p14="http://schemas.microsoft.com/office/powerpoint/2010/main" val="1213240605"/>
+        <p14:creationId xmlns:p14="http://schemas.microsoft.com/office/powerpoint/2010/main" xmlns="" val="1213240605"/>
       </p:ext>
     </p:extLst>
   </p:cSld>
@@ -744,7 +744,7 @@
     </p:spTree>
     <p:extLst>
       <p:ext uri="{BB962C8B-B14F-4D97-AF65-F5344CB8AC3E}">
-        <p14:creationId xmlns="" xmlns:p14="http://schemas.microsoft.com/office/powerpoint/2010/main" val="3985201946"/>
+        <p14:creationId xmlns:p14="http://schemas.microsoft.com/office/powerpoint/2010/main" xmlns="" val="3985201946"/>
       </p:ext>
     </p:extLst>
   </p:cSld>
@@ -2199,7 +2199,7 @@
     </p:spTree>
     <p:extLst>
       <p:ext uri="{BB962C8B-B14F-4D97-AF65-F5344CB8AC3E}">
-        <p14:creationId xmlns="" xmlns:p14="http://schemas.microsoft.com/office/powerpoint/2010/main" val="3141685506"/>
+        <p14:creationId xmlns:p14="http://schemas.microsoft.com/office/powerpoint/2010/main" xmlns="" val="3141685506"/>
       </p:ext>
     </p:extLst>
   </p:cSld>
@@ -5065,7 +5065,7 @@
           <a:blip r:embed="rId7" cstate="print">
             <a:extLst>
               <a:ext uri="{28A0092B-C50C-407E-A947-70E740481C1C}">
-                <a14:useLocalDpi xmlns="" xmlns:a14="http://schemas.microsoft.com/office/drawing/2010/main" val="0"/>
+                <a14:useLocalDpi xmlns:a14="http://schemas.microsoft.com/office/drawing/2010/main" xmlns="" val="0"/>
               </a:ext>
             </a:extLst>
           </a:blip>
@@ -5085,7 +5085,7 @@
           <a:noFill/>
           <a:extLst>
             <a:ext uri="{909E8E84-426E-40DD-AFC4-6F175D3DCCD1}">
-              <a14:hiddenFill xmlns="" xmlns:a14="http://schemas.microsoft.com/office/drawing/2010/main">
+              <a14:hiddenFill xmlns:a14="http://schemas.microsoft.com/office/drawing/2010/main" xmlns="">
                 <a:solidFill>
                   <a:srgbClr val="FFFFFF"/>
                 </a:solidFill>
@@ -5106,7 +5106,7 @@
           <a:blip r:embed="rId8" cstate="email">
             <a:extLst>
               <a:ext uri="{28A0092B-C50C-407E-A947-70E740481C1C}">
-                <a14:useLocalDpi xmlns="" xmlns:a14="http://schemas.microsoft.com/office/drawing/2010/main" val="0"/>
+                <a14:useLocalDpi xmlns:a14="http://schemas.microsoft.com/office/drawing/2010/main" xmlns="" val="0"/>
               </a:ext>
             </a:extLst>
           </a:blip>
@@ -5130,14 +5130,14 @@
           <a:effectLst/>
           <a:extLst>
             <a:ext uri="{909E8E84-426E-40DD-AFC4-6F175D3DCCD1}">
-              <a14:hiddenFill xmlns="" xmlns:a14="http://schemas.microsoft.com/office/drawing/2010/main">
+              <a14:hiddenFill xmlns:a14="http://schemas.microsoft.com/office/drawing/2010/main" xmlns="">
                 <a:solidFill>
                   <a:schemeClr val="accent1"/>
                 </a:solidFill>
               </a14:hiddenFill>
             </a:ext>
             <a:ext uri="{91240B29-F687-4F45-9708-019B960494DF}">
-              <a14:hiddenLine xmlns="" xmlns:a14="http://schemas.microsoft.com/office/drawing/2010/main" w="9525">
+              <a14:hiddenLine xmlns:a14="http://schemas.microsoft.com/office/drawing/2010/main" xmlns="" w="9525">
                 <a:solidFill>
                   <a:schemeClr val="tx1"/>
                 </a:solidFill>
@@ -5147,7 +5147,7 @@
               </a14:hiddenLine>
             </a:ext>
             <a:ext uri="{AF507438-7753-43E0-B8FC-AC1667EBCBE1}">
-              <a14:hiddenEffects xmlns="" xmlns:a14="http://schemas.microsoft.com/office/drawing/2010/main">
+              <a14:hiddenEffects xmlns:a14="http://schemas.microsoft.com/office/drawing/2010/main" xmlns="">
                 <a:effectLst>
                   <a:outerShdw dist="35921" dir="2700000" algn="ctr" rotWithShape="0">
                     <a:schemeClr val="bg2"/>
@@ -5170,7 +5170,7 @@
           <a:blip r:embed="rId9" cstate="email">
             <a:extLst>
               <a:ext uri="{28A0092B-C50C-407E-A947-70E740481C1C}">
-                <a14:useLocalDpi xmlns="" xmlns:a14="http://schemas.microsoft.com/office/drawing/2010/main" val="0"/>
+                <a14:useLocalDpi xmlns:a14="http://schemas.microsoft.com/office/drawing/2010/main" xmlns="" val="0"/>
               </a:ext>
             </a:extLst>
           </a:blip>
@@ -5194,14 +5194,14 @@
           <a:effectLst/>
           <a:extLst>
             <a:ext uri="{909E8E84-426E-40DD-AFC4-6F175D3DCCD1}">
-              <a14:hiddenFill xmlns="" xmlns:a14="http://schemas.microsoft.com/office/drawing/2010/main">
+              <a14:hiddenFill xmlns:a14="http://schemas.microsoft.com/office/drawing/2010/main" xmlns="">
                 <a:solidFill>
                   <a:schemeClr val="accent1"/>
                 </a:solidFill>
               </a14:hiddenFill>
             </a:ext>
             <a:ext uri="{91240B29-F687-4F45-9708-019B960494DF}">
-              <a14:hiddenLine xmlns="" xmlns:a14="http://schemas.microsoft.com/office/drawing/2010/main" w="9525">
+              <a14:hiddenLine xmlns:a14="http://schemas.microsoft.com/office/drawing/2010/main" xmlns="" w="9525">
                 <a:solidFill>
                   <a:schemeClr val="tx1"/>
                 </a:solidFill>
@@ -5211,7 +5211,7 @@
               </a14:hiddenLine>
             </a:ext>
             <a:ext uri="{AF507438-7753-43E0-B8FC-AC1667EBCBE1}">
-              <a14:hiddenEffects xmlns="" xmlns:a14="http://schemas.microsoft.com/office/drawing/2010/main">
+              <a14:hiddenEffects xmlns:a14="http://schemas.microsoft.com/office/drawing/2010/main" xmlns="">
                 <a:effectLst>
                   <a:outerShdw dist="35921" dir="2700000" algn="ctr" rotWithShape="0">
                     <a:schemeClr val="bg2"/>
@@ -5234,7 +5234,7 @@
           <a:blip r:embed="rId10" cstate="print">
             <a:extLst>
               <a:ext uri="{BEBA8EAE-BF5A-486C-A8C5-ECC9F3942E4B}">
-                <a14:imgProps xmlns="" xmlns:a14="http://schemas.microsoft.com/office/drawing/2010/main">
+                <a14:imgProps xmlns:a14="http://schemas.microsoft.com/office/drawing/2010/main" xmlns="">
                   <a14:imgLayer r:embed="rId11">
                     <a14:imgEffect>
                       <a14:brightnessContrast bright="20000"/>
@@ -5243,7 +5243,7 @@
                 </a14:imgProps>
               </a:ext>
               <a:ext uri="{28A0092B-C50C-407E-A947-70E740481C1C}">
-                <a14:useLocalDpi xmlns="" xmlns:a14="http://schemas.microsoft.com/office/drawing/2010/main" val="0"/>
+                <a14:useLocalDpi xmlns:a14="http://schemas.microsoft.com/office/drawing/2010/main" xmlns="" val="0"/>
               </a:ext>
             </a:extLst>
           </a:blip>
@@ -5271,7 +5271,7 @@
           </a:effectLst>
           <a:extLst>
             <a:ext uri="{909E8E84-426E-40DD-AFC4-6F175D3DCCD1}">
-              <a14:hiddenFill xmlns="" xmlns:a14="http://schemas.microsoft.com/office/drawing/2010/main">
+              <a14:hiddenFill xmlns:a14="http://schemas.microsoft.com/office/drawing/2010/main" xmlns="">
                 <a:solidFill>
                   <a:srgbClr val="FFFFFF"/>
                 </a:solidFill>
@@ -5856,7 +5856,7 @@
             </a:endParaRPr>
           </a:p>
           <a:p>
-            <a:pPr algn="ctr">
+            <a:pPr algn="l">
               <a:buNone/>
             </a:pPr>
             <a:r>
@@ -5870,7 +5870,7 @@
             </a:r>
           </a:p>
           <a:p>
-            <a:pPr marL="1262063" lvl="1" indent="-914400"/>
+            <a:pPr marL="1262063" lvl="1" indent="-914400" algn="l"/>
             <a:r>
               <a:rPr lang="en-US" sz="3600" dirty="0" smtClean="0">
                 <a:solidFill>
@@ -5886,7 +5886,7 @@
             </a:endParaRPr>
           </a:p>
           <a:p>
-            <a:pPr marL="1262063" lvl="1" indent="-914400"/>
+            <a:pPr marL="1262063" lvl="1" indent="-914400" algn="l"/>
             <a:r>
               <a:rPr lang="en-US" sz="3600" dirty="0" smtClean="0">
                 <a:solidFill>
@@ -5902,7 +5902,7 @@
             </a:endParaRPr>
           </a:p>
           <a:p>
-            <a:pPr marL="1262063" lvl="1" indent="-914400"/>
+            <a:pPr marL="1262063" lvl="1" indent="-914400" algn="l"/>
             <a:r>
               <a:rPr lang="en-US" sz="3600" dirty="0" smtClean="0">
                 <a:solidFill>
@@ -5965,10 +5965,41 @@
           </a:p>
         </p:txBody>
       </p:sp>
+      <p:pic>
+        <p:nvPicPr>
+          <p:cNvPr id="1026" name="Picture 2" descr="C:\Users\ScorpS\Desktop\arsenic.png"/>
+          <p:cNvPicPr>
+            <a:picLocks noChangeAspect="1" noChangeArrowheads="1"/>
+          </p:cNvPicPr>
+          <p:nvPr/>
+        </p:nvPicPr>
+        <p:blipFill>
+          <a:blip r:embed="rId2" cstate="print"/>
+          <a:srcRect/>
+          <a:stretch>
+            <a:fillRect/>
+          </a:stretch>
+        </p:blipFill>
+        <p:spPr bwMode="auto">
+          <a:xfrm>
+            <a:off x="5257800" y="3505200"/>
+            <a:ext cx="2443162" cy="2443162"/>
+          </a:xfrm>
+          <a:prstGeom prst="rect">
+            <a:avLst/>
+          </a:prstGeom>
+          <a:ln>
+            <a:noFill/>
+          </a:ln>
+          <a:effectLst>
+            <a:softEdge rad="112500"/>
+          </a:effectLst>
+        </p:spPr>
+      </p:pic>
     </p:spTree>
     <p:extLst>
       <p:ext uri="{BB962C8B-B14F-4D97-AF65-F5344CB8AC3E}">
-        <p14:creationId xmlns="" xmlns:p14="http://schemas.microsoft.com/office/powerpoint/2010/main" val="4062452081"/>
+        <p14:creationId xmlns:p14="http://schemas.microsoft.com/office/powerpoint/2010/main" xmlns="" val="4062452081"/>
       </p:ext>
     </p:extLst>
   </p:cSld>
@@ -6511,11 +6542,7 @@
             </a:r>
             <a:r>
               <a:rPr lang="en-US" dirty="0" smtClean="0"/>
-              <a:t>() – </a:t>
-            </a:r>
-            <a:r>
-              <a:rPr lang="en-US" dirty="0" smtClean="0"/>
-              <a:t>renamed from </a:t>
+              <a:t>() – renamed from </a:t>
             </a:r>
             <a:r>
               <a:rPr lang="en-US" dirty="0" smtClean="0">
@@ -6523,15 +6550,7 @@
                   <a:schemeClr val="tx2"/>
                 </a:solidFill>
               </a:rPr>
-              <a:t>Krai</a:t>
-            </a:r>
-            <a:r>
-              <a:rPr lang="en-US" dirty="0" smtClean="0">
-                <a:solidFill>
-                  <a:schemeClr val="tx2"/>
-                </a:solidFill>
-              </a:rPr>
-              <a:t>()</a:t>
+              <a:t>Krai()</a:t>
             </a:r>
           </a:p>
           <a:p>
@@ -6999,11 +7018,7 @@
             <a:pPr lvl="3"/>
             <a:r>
               <a:rPr lang="en-US" dirty="0" smtClean="0"/>
-              <a:t>VisualizeBattleField() – draws the game</a:t>
-            </a:r>
-            <a:r>
-              <a:rPr lang="en-US" dirty="0" smtClean="0"/>
-              <a:t>.</a:t>
+              <a:t>VisualizeBattleField() – draws the game.</a:t>
             </a:r>
           </a:p>
           <a:p>
@@ -7163,15 +7178,7 @@
                   <a:schemeClr val="tx1"/>
                 </a:solidFill>
               </a:rPr>
-              <a:t>   class </a:t>
-            </a:r>
-            <a:r>
-              <a:rPr lang="en-US" dirty="0" smtClean="0">
-                <a:solidFill>
-                  <a:schemeClr val="tx1"/>
-                </a:solidFill>
-              </a:rPr>
-              <a:t>ConsoleInput contains:</a:t>
+              <a:t>   class ConsoleInput contains:</a:t>
             </a:r>
             <a:endParaRPr lang="en-US" dirty="0" smtClean="0"/>
           </a:p>

</xml_diff>